<commit_message>
evan claiming 2 forms
</commit_message>
<xml_diff>
--- a/docs/tables&forms.pptx
+++ b/docs/tables&forms.pptx
@@ -4426,7 +4426,7 @@
           <a:p>
             <a:r>
               <a:rPr lang="en-US" b="1" u="sng" dirty="0"/>
-              <a:t>Form1.</a:t>
+              <a:t>Form1: EVAN</a:t>
             </a:r>
           </a:p>
           <a:p>
@@ -5329,7 +5329,7 @@
           <a:p>
             <a:r>
               <a:rPr lang="en-US" b="1" u="sng" dirty="0"/>
-              <a:t>Form2.</a:t>
+              <a:t>Form2: EVAN</a:t>
             </a:r>
           </a:p>
           <a:p>

</xml_diff>

<commit_message>
update db, update forms powerpoint
-update db, starting from scratch again with 2 tables user_profile and test_sample. changes are as described in the powerpoint slides in the docs folder.
-updated powerpoint in the docs folder
-moved old db to the old folder
-added a note for myself in the docs/newTextDocument file, note is regarding primary/foreign key relationships.
</commit_message>
<xml_diff>
--- a/docs/tables&forms.pptx
+++ b/docs/tables&forms.pptx
@@ -261,7 +261,7 @@
           <a:p>
             <a:fld id="{01B4D459-FF4E-41B5-A9D8-F037FDF5DCAA}" type="datetimeFigureOut">
               <a:rPr lang="en-US" smtClean="0"/>
-              <a:t>9/30/2021</a:t>
+              <a:t>10/1/2021</a:t>
             </a:fld>
             <a:endParaRPr lang="en-US"/>
           </a:p>
@@ -459,7 +459,7 @@
           <a:p>
             <a:fld id="{01B4D459-FF4E-41B5-A9D8-F037FDF5DCAA}" type="datetimeFigureOut">
               <a:rPr lang="en-US" smtClean="0"/>
-              <a:t>9/30/2021</a:t>
+              <a:t>10/1/2021</a:t>
             </a:fld>
             <a:endParaRPr lang="en-US"/>
           </a:p>
@@ -667,7 +667,7 @@
           <a:p>
             <a:fld id="{01B4D459-FF4E-41B5-A9D8-F037FDF5DCAA}" type="datetimeFigureOut">
               <a:rPr lang="en-US" smtClean="0"/>
-              <a:t>9/30/2021</a:t>
+              <a:t>10/1/2021</a:t>
             </a:fld>
             <a:endParaRPr lang="en-US"/>
           </a:p>
@@ -865,7 +865,7 @@
           <a:p>
             <a:fld id="{01B4D459-FF4E-41B5-A9D8-F037FDF5DCAA}" type="datetimeFigureOut">
               <a:rPr lang="en-US" smtClean="0"/>
-              <a:t>9/30/2021</a:t>
+              <a:t>10/1/2021</a:t>
             </a:fld>
             <a:endParaRPr lang="en-US"/>
           </a:p>
@@ -1140,7 +1140,7 @@
           <a:p>
             <a:fld id="{01B4D459-FF4E-41B5-A9D8-F037FDF5DCAA}" type="datetimeFigureOut">
               <a:rPr lang="en-US" smtClean="0"/>
-              <a:t>9/30/2021</a:t>
+              <a:t>10/1/2021</a:t>
             </a:fld>
             <a:endParaRPr lang="en-US"/>
           </a:p>
@@ -1405,7 +1405,7 @@
           <a:p>
             <a:fld id="{01B4D459-FF4E-41B5-A9D8-F037FDF5DCAA}" type="datetimeFigureOut">
               <a:rPr lang="en-US" smtClean="0"/>
-              <a:t>9/30/2021</a:t>
+              <a:t>10/1/2021</a:t>
             </a:fld>
             <a:endParaRPr lang="en-US"/>
           </a:p>
@@ -1817,7 +1817,7 @@
           <a:p>
             <a:fld id="{01B4D459-FF4E-41B5-A9D8-F037FDF5DCAA}" type="datetimeFigureOut">
               <a:rPr lang="en-US" smtClean="0"/>
-              <a:t>9/30/2021</a:t>
+              <a:t>10/1/2021</a:t>
             </a:fld>
             <a:endParaRPr lang="en-US"/>
           </a:p>
@@ -1958,7 +1958,7 @@
           <a:p>
             <a:fld id="{01B4D459-FF4E-41B5-A9D8-F037FDF5DCAA}" type="datetimeFigureOut">
               <a:rPr lang="en-US" smtClean="0"/>
-              <a:t>9/30/2021</a:t>
+              <a:t>10/1/2021</a:t>
             </a:fld>
             <a:endParaRPr lang="en-US"/>
           </a:p>
@@ -2071,7 +2071,7 @@
           <a:p>
             <a:fld id="{01B4D459-FF4E-41B5-A9D8-F037FDF5DCAA}" type="datetimeFigureOut">
               <a:rPr lang="en-US" smtClean="0"/>
-              <a:t>9/30/2021</a:t>
+              <a:t>10/1/2021</a:t>
             </a:fld>
             <a:endParaRPr lang="en-US"/>
           </a:p>
@@ -2382,7 +2382,7 @@
           <a:p>
             <a:fld id="{01B4D459-FF4E-41B5-A9D8-F037FDF5DCAA}" type="datetimeFigureOut">
               <a:rPr lang="en-US" smtClean="0"/>
-              <a:t>9/30/2021</a:t>
+              <a:t>10/1/2021</a:t>
             </a:fld>
             <a:endParaRPr lang="en-US"/>
           </a:p>
@@ -2670,7 +2670,7 @@
           <a:p>
             <a:fld id="{01B4D459-FF4E-41B5-A9D8-F037FDF5DCAA}" type="datetimeFigureOut">
               <a:rPr lang="en-US" smtClean="0"/>
-              <a:t>9/30/2021</a:t>
+              <a:t>10/1/2021</a:t>
             </a:fld>
             <a:endParaRPr lang="en-US"/>
           </a:p>
@@ -2911,7 +2911,7 @@
           <a:p>
             <a:fld id="{01B4D459-FF4E-41B5-A9D8-F037FDF5DCAA}" type="datetimeFigureOut">
               <a:rPr lang="en-US" smtClean="0"/>
-              <a:t>9/30/2021</a:t>
+              <a:t>10/1/2021</a:t>
             </a:fld>
             <a:endParaRPr lang="en-US"/>
           </a:p>
@@ -4847,7 +4847,7 @@
           <p:nvPr>
             <p:extLst>
               <p:ext uri="{D42A27DB-BD31-4B8C-83A1-F6EECF244321}">
-                <p14:modId xmlns:p14="http://schemas.microsoft.com/office/powerpoint/2010/main" val="2101958522"/>
+                <p14:modId xmlns:p14="http://schemas.microsoft.com/office/powerpoint/2010/main" val="1951470023"/>
               </p:ext>
             </p:extLst>
           </p:nvPr>
@@ -5134,7 +5134,7 @@
                     <a:p>
                       <a:r>
                         <a:rPr lang="en-US" dirty="0"/>
-                        <a:t>int(10)</a:t>
+                        <a:t>int(9)</a:t>
                       </a:r>
                     </a:p>
                   </a:txBody>
@@ -5255,7 +5255,7 @@
           <a:p>
             <a:r>
               <a:rPr lang="en-US" sz="1100" dirty="0"/>
-              <a:t>-The “date” datatype requires a specific format - how can we make the form force them into putting the date into a specific format? Hint: u can do this with basic html</a:t>
+              <a:t>-The “date” datatype for the dob requires a specific format - how can we make the form force them into putting the date into a specific format? Hint: do this with basic html</a:t>
             </a:r>
           </a:p>
           <a:p>
@@ -5391,13 +5391,13 @@
           <p:nvPr>
             <p:extLst>
               <p:ext uri="{D42A27DB-BD31-4B8C-83A1-F6EECF244321}">
-                <p14:modId xmlns:p14="http://schemas.microsoft.com/office/powerpoint/2010/main" val="4097392300"/>
+                <p14:modId xmlns:p14="http://schemas.microsoft.com/office/powerpoint/2010/main" val="2518608614"/>
               </p:ext>
             </p:extLst>
           </p:nvPr>
         </p:nvGraphicFramePr>
         <p:xfrm>
-          <a:off x="7340022" y="2415789"/>
+          <a:off x="7340022" y="745034"/>
           <a:ext cx="3944616" cy="2560320"/>
         </p:xfrm>
         <a:graphic>
@@ -5730,6 +5730,254 @@
           </a:graphicData>
         </a:graphic>
       </p:graphicFrame>
+      <p:sp>
+        <p:nvSpPr>
+          <p:cNvPr id="2" name="TextBox 1">
+            <a:extLst>
+              <a:ext uri="{FF2B5EF4-FFF2-40B4-BE49-F238E27FC236}">
+                <a16:creationId xmlns:a16="http://schemas.microsoft.com/office/drawing/2014/main" id="{836EC46A-FCD9-40F0-8B1A-29020A3AE68B}"/>
+              </a:ext>
+            </a:extLst>
+          </p:cNvPr>
+          <p:cNvSpPr txBox="1"/>
+          <p:nvPr/>
+        </p:nvSpPr>
+        <p:spPr>
+          <a:xfrm>
+            <a:off x="191911" y="1794933"/>
+            <a:ext cx="6897511" cy="1754326"/>
+          </a:xfrm>
+          <a:prstGeom prst="rect">
+            <a:avLst/>
+          </a:prstGeom>
+          <a:noFill/>
+        </p:spPr>
+        <p:txBody>
+          <a:bodyPr wrap="square" rtlCol="0">
+            <a:spAutoFit/>
+          </a:bodyPr>
+          <a:lstStyle/>
+          <a:p>
+            <a:r>
+              <a:rPr lang="en-US" dirty="0"/>
+              <a:t>Patient </a:t>
+            </a:r>
+            <a:r>
+              <a:rPr lang="en-US" dirty="0" err="1"/>
+              <a:t>ssn</a:t>
+            </a:r>
+            <a:r>
+              <a:rPr lang="en-US" dirty="0"/>
+              <a:t>:</a:t>
+            </a:r>
+          </a:p>
+          <a:p>
+            <a:endParaRPr lang="en-US" dirty="0"/>
+          </a:p>
+          <a:p>
+            <a:endParaRPr lang="en-US" dirty="0"/>
+          </a:p>
+          <a:p>
+            <a:r>
+              <a:rPr lang="en-US" dirty="0"/>
+              <a:t>Serial number:</a:t>
+            </a:r>
+          </a:p>
+          <a:p>
+            <a:endParaRPr lang="en-US" dirty="0"/>
+          </a:p>
+          <a:p>
+            <a:endParaRPr lang="en-US" dirty="0"/>
+          </a:p>
+        </p:txBody>
+      </p:sp>
+      <p:sp>
+        <p:nvSpPr>
+          <p:cNvPr id="7" name="Rectangle 6">
+            <a:extLst>
+              <a:ext uri="{FF2B5EF4-FFF2-40B4-BE49-F238E27FC236}">
+                <a16:creationId xmlns:a16="http://schemas.microsoft.com/office/drawing/2014/main" id="{9E2AB13E-0688-402E-A9A0-BF3855FB287C}"/>
+              </a:ext>
+            </a:extLst>
+          </p:cNvPr>
+          <p:cNvSpPr/>
+          <p:nvPr/>
+        </p:nvSpPr>
+        <p:spPr>
+          <a:xfrm>
+            <a:off x="1992484" y="1814808"/>
+            <a:ext cx="1862667" cy="508000"/>
+          </a:xfrm>
+          <a:prstGeom prst="rect">
+            <a:avLst/>
+          </a:prstGeom>
+        </p:spPr>
+        <p:style>
+          <a:lnRef idx="2">
+            <a:schemeClr val="accent6"/>
+          </a:lnRef>
+          <a:fillRef idx="1">
+            <a:schemeClr val="lt1"/>
+          </a:fillRef>
+          <a:effectRef idx="0">
+            <a:schemeClr val="accent6"/>
+          </a:effectRef>
+          <a:fontRef idx="minor">
+            <a:schemeClr val="dk1"/>
+          </a:fontRef>
+        </p:style>
+        <p:txBody>
+          <a:bodyPr rtlCol="0" anchor="ctr"/>
+          <a:lstStyle/>
+          <a:p>
+            <a:pPr algn="ctr"/>
+            <a:endParaRPr lang="en-US"/>
+          </a:p>
+        </p:txBody>
+      </p:sp>
+      <p:sp>
+        <p:nvSpPr>
+          <p:cNvPr id="8" name="Rectangle 7">
+            <a:extLst>
+              <a:ext uri="{FF2B5EF4-FFF2-40B4-BE49-F238E27FC236}">
+                <a16:creationId xmlns:a16="http://schemas.microsoft.com/office/drawing/2014/main" id="{D40EC264-8A23-49C0-9943-5A71FC8A5076}"/>
+              </a:ext>
+            </a:extLst>
+          </p:cNvPr>
+          <p:cNvSpPr/>
+          <p:nvPr/>
+        </p:nvSpPr>
+        <p:spPr>
+          <a:xfrm>
+            <a:off x="1992484" y="2682033"/>
+            <a:ext cx="1862667" cy="508000"/>
+          </a:xfrm>
+          <a:prstGeom prst="rect">
+            <a:avLst/>
+          </a:prstGeom>
+        </p:spPr>
+        <p:style>
+          <a:lnRef idx="2">
+            <a:schemeClr val="accent6"/>
+          </a:lnRef>
+          <a:fillRef idx="1">
+            <a:schemeClr val="lt1"/>
+          </a:fillRef>
+          <a:effectRef idx="0">
+            <a:schemeClr val="accent6"/>
+          </a:effectRef>
+          <a:fontRef idx="minor">
+            <a:schemeClr val="dk1"/>
+          </a:fontRef>
+        </p:style>
+        <p:txBody>
+          <a:bodyPr rtlCol="0" anchor="ctr"/>
+          <a:lstStyle/>
+          <a:p>
+            <a:pPr algn="ctr"/>
+            <a:endParaRPr lang="en-US"/>
+          </a:p>
+        </p:txBody>
+      </p:sp>
+      <p:sp>
+        <p:nvSpPr>
+          <p:cNvPr id="10" name="TextBox 9">
+            <a:extLst>
+              <a:ext uri="{FF2B5EF4-FFF2-40B4-BE49-F238E27FC236}">
+                <a16:creationId xmlns:a16="http://schemas.microsoft.com/office/drawing/2014/main" id="{FABD16D3-4D14-4927-8CA7-91CF7DA6ED78}"/>
+              </a:ext>
+            </a:extLst>
+          </p:cNvPr>
+          <p:cNvSpPr txBox="1"/>
+          <p:nvPr/>
+        </p:nvSpPr>
+        <p:spPr>
+          <a:xfrm>
+            <a:off x="4560711" y="3429000"/>
+            <a:ext cx="6897511" cy="1277273"/>
+          </a:xfrm>
+          <a:prstGeom prst="rect">
+            <a:avLst/>
+          </a:prstGeom>
+          <a:noFill/>
+        </p:spPr>
+        <p:txBody>
+          <a:bodyPr wrap="square" rtlCol="0">
+            <a:spAutoFit/>
+          </a:bodyPr>
+          <a:lstStyle/>
+          <a:p>
+            <a:r>
+              <a:rPr lang="en-US" sz="1100" dirty="0"/>
+              <a:t>General notes:</a:t>
+            </a:r>
+          </a:p>
+          <a:p>
+            <a:r>
+              <a:rPr lang="en-US" sz="1100" dirty="0"/>
+              <a:t>-the employee will enter </a:t>
+            </a:r>
+            <a:r>
+              <a:rPr lang="en-US" sz="1100" dirty="0" err="1"/>
+              <a:t>ssn</a:t>
+            </a:r>
+            <a:r>
+              <a:rPr lang="en-US" sz="1100" dirty="0"/>
+              <a:t> and serial key and press submit, if the </a:t>
+            </a:r>
+            <a:r>
+              <a:rPr lang="en-US" sz="1100" dirty="0" err="1"/>
+              <a:t>ssn</a:t>
+            </a:r>
+            <a:r>
+              <a:rPr lang="en-US" sz="1100" dirty="0"/>
+              <a:t> doesn’t match an </a:t>
+            </a:r>
+            <a:r>
+              <a:rPr lang="en-US" sz="1100" dirty="0" err="1"/>
+              <a:t>ssn</a:t>
+            </a:r>
+            <a:r>
+              <a:rPr lang="en-US" sz="1100" dirty="0"/>
+              <a:t> in the </a:t>
+            </a:r>
+            <a:r>
+              <a:rPr lang="en-US" sz="1100" dirty="0" err="1"/>
+              <a:t>user_profile</a:t>
+            </a:r>
+            <a:r>
+              <a:rPr lang="en-US" sz="1100" dirty="0"/>
+              <a:t> table then the user does not exist and the </a:t>
+            </a:r>
+            <a:r>
+              <a:rPr lang="en-US" sz="1100" dirty="0" err="1"/>
+              <a:t>test_sample</a:t>
+            </a:r>
+            <a:r>
+              <a:rPr lang="en-US" sz="1100" dirty="0"/>
+              <a:t> insert will fail and nothing will be inserted</a:t>
+            </a:r>
+          </a:p>
+          <a:p>
+            <a:endParaRPr lang="en-US" sz="1100" dirty="0"/>
+          </a:p>
+          <a:p>
+            <a:r>
+              <a:rPr lang="en-US" sz="1100" dirty="0"/>
+              <a:t>-the date is automatically calculated and entered via the date() function in php</a:t>
+            </a:r>
+          </a:p>
+          <a:p>
+            <a:endParaRPr lang="en-US" sz="1100" dirty="0"/>
+          </a:p>
+          <a:p>
+            <a:r>
+              <a:rPr lang="en-US" sz="1100" dirty="0"/>
+              <a:t>-the result will be entered as a NULL value until later when the lab says 0 or 1</a:t>
+            </a:r>
+          </a:p>
+        </p:txBody>
+      </p:sp>
     </p:spTree>
     <p:extLst>
       <p:ext uri="{BB962C8B-B14F-4D97-AF65-F5344CB8AC3E}">

</xml_diff>